<commit_message>
Rezolvat un bug in GUI
</commit_message>
<xml_diff>
--- a/docs/Aplicație traducere.pptx
+++ b/docs/Aplicație traducere.pptx
@@ -11220,13 +11220,13 @@
   <p:clrMapOvr>
     <a:masterClrMapping/>
   </p:clrMapOvr>
-  <mc:AlternateContent xmlns:mc="http://schemas.openxmlformats.org/markup-compatibility/2006">
-    <mc:Choice xmlns:p14="http://schemas.microsoft.com/office/powerpoint/2010/main" Requires="p14">
+  <mc:AlternateContent xmlns:mc="http://schemas.openxmlformats.org/markup-compatibility/2006" xmlns:p14="http://schemas.microsoft.com/office/powerpoint/2010/main">
+    <mc:Choice Requires="p14">
       <p:transition spd="med" p14:dur="700">
         <p:fade/>
       </p:transition>
     </mc:Choice>
-    <mc:Fallback>
+    <mc:Fallback xmlns="">
       <p:transition spd="med">
         <p:fade/>
       </p:transition>
@@ -12323,13 +12323,13 @@
   <p:clrMapOvr>
     <a:masterClrMapping/>
   </p:clrMapOvr>
-  <mc:AlternateContent xmlns:mc="http://schemas.openxmlformats.org/markup-compatibility/2006">
-    <mc:Choice xmlns:p159="http://schemas.microsoft.com/office/powerpoint/2015/09/main" Requires="p159">
+  <mc:AlternateContent xmlns:mc="http://schemas.openxmlformats.org/markup-compatibility/2006" xmlns:p159="http://schemas.microsoft.com/office/powerpoint/2015/09/main">
+    <mc:Choice Requires="p159">
       <p:transition xmlns:p14="http://schemas.microsoft.com/office/powerpoint/2010/main" spd="slow" p14:dur="2000">
         <p159:morph option="byObject"/>
       </p:transition>
     </mc:Choice>
-    <mc:Fallback>
+    <mc:Fallback xmlns="">
       <p:transition spd="slow">
         <p:fade/>
       </p:transition>
@@ -13426,13 +13426,13 @@
   <p:clrMapOvr>
     <a:masterClrMapping/>
   </p:clrMapOvr>
-  <mc:AlternateContent xmlns:mc="http://schemas.openxmlformats.org/markup-compatibility/2006">
-    <mc:Choice xmlns:p159="http://schemas.microsoft.com/office/powerpoint/2015/09/main" Requires="p159">
+  <mc:AlternateContent xmlns:mc="http://schemas.openxmlformats.org/markup-compatibility/2006" xmlns:p159="http://schemas.microsoft.com/office/powerpoint/2015/09/main">
+    <mc:Choice Requires="p159">
       <p:transition xmlns:p14="http://schemas.microsoft.com/office/powerpoint/2010/main" spd="slow" p14:dur="2000">
         <p159:morph option="byObject"/>
       </p:transition>
     </mc:Choice>
-    <mc:Fallback>
+    <mc:Fallback xmlns="">
       <p:transition spd="slow">
         <p:fade/>
       </p:transition>
@@ -14431,13 +14431,13 @@
   <p:clrMapOvr>
     <a:masterClrMapping/>
   </p:clrMapOvr>
-  <mc:AlternateContent xmlns:mc="http://schemas.openxmlformats.org/markup-compatibility/2006">
-    <mc:Choice xmlns:p159="http://schemas.microsoft.com/office/powerpoint/2015/09/main" Requires="p159">
+  <mc:AlternateContent xmlns:mc="http://schemas.openxmlformats.org/markup-compatibility/2006" xmlns:p159="http://schemas.microsoft.com/office/powerpoint/2015/09/main">
+    <mc:Choice Requires="p159">
       <p:transition xmlns:p14="http://schemas.microsoft.com/office/powerpoint/2010/main" spd="slow" p14:dur="2000">
         <p159:morph option="byObject"/>
       </p:transition>
     </mc:Choice>
-    <mc:Fallback>
+    <mc:Fallback xmlns="">
       <p:transition spd="slow">
         <p:fade/>
       </p:transition>
@@ -15110,7 +15110,23 @@
                   <a:schemeClr val="bg1"/>
                 </a:solidFill>
               </a:rPr>
-              <a:t>M2M100 </a:t>
+              <a:t>M</a:t>
+            </a:r>
+            <a:r>
+              <a:rPr lang="ro-RO" dirty="0">
+                <a:solidFill>
+                  <a:schemeClr val="bg1"/>
+                </a:solidFill>
+              </a:rPr>
+              <a:t>odelul</a:t>
+            </a:r>
+            <a:r>
+              <a:rPr lang="en-US" dirty="0">
+                <a:solidFill>
+                  <a:schemeClr val="bg1"/>
+                </a:solidFill>
+              </a:rPr>
+              <a:t> </a:t>
             </a:r>
             <a:r>
               <a:rPr lang="en-US" dirty="0" err="1">
@@ -15576,13 +15592,13 @@
   <p:clrMapOvr>
     <a:masterClrMapping/>
   </p:clrMapOvr>
-  <mc:AlternateContent xmlns:mc="http://schemas.openxmlformats.org/markup-compatibility/2006">
-    <mc:Choice xmlns:p14="http://schemas.microsoft.com/office/powerpoint/2010/main" Requires="p14">
+  <mc:AlternateContent xmlns:mc="http://schemas.openxmlformats.org/markup-compatibility/2006" xmlns:p14="http://schemas.microsoft.com/office/powerpoint/2010/main">
+    <mc:Choice Requires="p14">
       <p:transition spd="slow" p14:dur="800">
         <p14:flythrough/>
       </p:transition>
     </mc:Choice>
-    <mc:Fallback>
+    <mc:Fallback xmlns="">
       <p:transition spd="slow">
         <p:fade/>
       </p:transition>
@@ -15887,13 +15903,13 @@
   <p:clrMapOvr>
     <a:masterClrMapping/>
   </p:clrMapOvr>
-  <mc:AlternateContent xmlns:mc="http://schemas.openxmlformats.org/markup-compatibility/2006">
-    <mc:Choice xmlns:p159="http://schemas.microsoft.com/office/powerpoint/2015/09/main" Requires="p159">
+  <mc:AlternateContent xmlns:mc="http://schemas.openxmlformats.org/markup-compatibility/2006" xmlns:p159="http://schemas.microsoft.com/office/powerpoint/2015/09/main">
+    <mc:Choice Requires="p159">
       <p:transition xmlns:p14="http://schemas.microsoft.com/office/powerpoint/2010/main" spd="slow" p14:dur="2000">
         <p159:morph option="byObject"/>
       </p:transition>
     </mc:Choice>
-    <mc:Fallback>
+    <mc:Fallback xmlns="">
       <p:transition spd="slow">
         <p:fade/>
       </p:transition>
@@ -16204,13 +16220,13 @@
   <p:clrMapOvr>
     <a:masterClrMapping/>
   </p:clrMapOvr>
-  <mc:AlternateContent xmlns:mc="http://schemas.openxmlformats.org/markup-compatibility/2006">
-    <mc:Choice xmlns:p159="http://schemas.microsoft.com/office/powerpoint/2015/09/main" Requires="p159">
+  <mc:AlternateContent xmlns:mc="http://schemas.openxmlformats.org/markup-compatibility/2006" xmlns:p159="http://schemas.microsoft.com/office/powerpoint/2015/09/main">
+    <mc:Choice Requires="p159">
       <p:transition xmlns:p14="http://schemas.microsoft.com/office/powerpoint/2010/main" spd="slow" p14:dur="2000">
         <p159:morph option="byObject"/>
       </p:transition>
     </mc:Choice>
-    <mc:Fallback>
+    <mc:Fallback xmlns="">
       <p:transition spd="slow">
         <p:fade/>
       </p:transition>
@@ -16703,13 +16719,13 @@
   <p:clrMapOvr>
     <a:masterClrMapping/>
   </p:clrMapOvr>
-  <mc:AlternateContent xmlns:mc="http://schemas.openxmlformats.org/markup-compatibility/2006">
-    <mc:Choice xmlns:p159="http://schemas.microsoft.com/office/powerpoint/2015/09/main" Requires="p159">
+  <mc:AlternateContent xmlns:mc="http://schemas.openxmlformats.org/markup-compatibility/2006" xmlns:p159="http://schemas.microsoft.com/office/powerpoint/2015/09/main">
+    <mc:Choice Requires="p159">
       <p:transition xmlns:p14="http://schemas.microsoft.com/office/powerpoint/2010/main" spd="slow" p14:dur="2000">
         <p159:morph option="byObject"/>
       </p:transition>
     </mc:Choice>
-    <mc:Fallback>
+    <mc:Fallback xmlns="">
       <p:transition spd="slow">
         <p:fade/>
       </p:transition>
@@ -17208,13 +17224,13 @@
   <p:clrMapOvr>
     <a:masterClrMapping/>
   </p:clrMapOvr>
-  <mc:AlternateContent xmlns:mc="http://schemas.openxmlformats.org/markup-compatibility/2006">
-    <mc:Choice xmlns:p159="http://schemas.microsoft.com/office/powerpoint/2015/09/main" Requires="p159">
+  <mc:AlternateContent xmlns:mc="http://schemas.openxmlformats.org/markup-compatibility/2006" xmlns:p159="http://schemas.microsoft.com/office/powerpoint/2015/09/main">
+    <mc:Choice Requires="p159">
       <p:transition xmlns:p14="http://schemas.microsoft.com/office/powerpoint/2010/main" spd="slow" p14:dur="2000">
         <p159:morph option="byObject"/>
       </p:transition>
     </mc:Choice>
-    <mc:Fallback>
+    <mc:Fallback xmlns="">
       <p:transition spd="slow">
         <p:fade/>
       </p:transition>
@@ -17393,13 +17409,13 @@
   <p:clrMapOvr>
     <a:masterClrMapping/>
   </p:clrMapOvr>
-  <mc:AlternateContent xmlns:mc="http://schemas.openxmlformats.org/markup-compatibility/2006">
-    <mc:Choice xmlns:p159="http://schemas.microsoft.com/office/powerpoint/2015/09/main" Requires="p159">
+  <mc:AlternateContent xmlns:mc="http://schemas.openxmlformats.org/markup-compatibility/2006" xmlns:p159="http://schemas.microsoft.com/office/powerpoint/2015/09/main">
+    <mc:Choice Requires="p159">
       <p:transition xmlns:p14="http://schemas.microsoft.com/office/powerpoint/2010/main" spd="slow" p14:dur="2000">
         <p159:morph option="byObject"/>
       </p:transition>
     </mc:Choice>
-    <mc:Fallback>
+    <mc:Fallback xmlns="">
       <p:transition spd="slow">
         <p:fade/>
       </p:transition>
@@ -17584,13 +17600,13 @@
   <p:clrMapOvr>
     <a:masterClrMapping/>
   </p:clrMapOvr>
-  <mc:AlternateContent xmlns:mc="http://schemas.openxmlformats.org/markup-compatibility/2006">
-    <mc:Choice xmlns:p159="http://schemas.microsoft.com/office/powerpoint/2015/09/main" Requires="p159">
+  <mc:AlternateContent xmlns:mc="http://schemas.openxmlformats.org/markup-compatibility/2006" xmlns:p159="http://schemas.microsoft.com/office/powerpoint/2015/09/main">
+    <mc:Choice Requires="p159">
       <p:transition xmlns:p14="http://schemas.microsoft.com/office/powerpoint/2010/main" spd="slow" p14:dur="2000">
         <p159:morph option="byObject"/>
       </p:transition>
     </mc:Choice>
-    <mc:Fallback>
+    <mc:Fallback xmlns="">
       <p:transition spd="slow">
         <p:fade/>
       </p:transition>
@@ -18024,13 +18040,13 @@
   <p:clrMapOvr>
     <a:masterClrMapping/>
   </p:clrMapOvr>
-  <mc:AlternateContent xmlns:mc="http://schemas.openxmlformats.org/markup-compatibility/2006">
-    <mc:Choice xmlns:p159="http://schemas.microsoft.com/office/powerpoint/2015/09/main" Requires="p159">
+  <mc:AlternateContent xmlns:mc="http://schemas.openxmlformats.org/markup-compatibility/2006" xmlns:p159="http://schemas.microsoft.com/office/powerpoint/2015/09/main">
+    <mc:Choice Requires="p159">
       <p:transition xmlns:p14="http://schemas.microsoft.com/office/powerpoint/2010/main" spd="slow" p14:dur="2000">
         <p159:morph option="byObject"/>
       </p:transition>
     </mc:Choice>
-    <mc:Fallback>
+    <mc:Fallback xmlns="">
       <p:transition spd="slow">
         <p:fade/>
       </p:transition>
@@ -18464,13 +18480,13 @@
   <p:clrMapOvr>
     <a:masterClrMapping/>
   </p:clrMapOvr>
-  <mc:AlternateContent xmlns:mc="http://schemas.openxmlformats.org/markup-compatibility/2006">
-    <mc:Choice xmlns:p159="http://schemas.microsoft.com/office/powerpoint/2015/09/main" Requires="p159">
+  <mc:AlternateContent xmlns:mc="http://schemas.openxmlformats.org/markup-compatibility/2006" xmlns:p159="http://schemas.microsoft.com/office/powerpoint/2015/09/main">
+    <mc:Choice Requires="p159">
       <p:transition xmlns:p14="http://schemas.microsoft.com/office/powerpoint/2010/main" spd="slow" p14:dur="2000">
         <p159:morph option="byObject"/>
       </p:transition>
     </mc:Choice>
-    <mc:Fallback>
+    <mc:Fallback xmlns="">
       <p:transition spd="slow">
         <p:fade/>
       </p:transition>
@@ -19291,35 +19307,6 @@
 </file>
 
 <file path=customXml/item1.xml><?xml version="1.0" encoding="utf-8"?>
-<?mso-contentType ?>
-<FormTemplates xmlns="http://schemas.microsoft.com/sharepoint/v3/contenttype/forms">
-  <Display>DocumentLibraryForm</Display>
-  <Edit>DocumentLibraryForm</Edit>
-  <New>DocumentLibraryForm</New>
-</FormTemplates>
-</file>
-
-<file path=customXml/item2.xml><?xml version="1.0" encoding="utf-8"?>
-<p:properties xmlns:p="http://schemas.microsoft.com/office/2006/metadata/properties" xmlns:xsi="http://www.w3.org/2001/XMLSchema-instance" xmlns:pc="http://schemas.microsoft.com/office/infopath/2007/PartnerControls">
-  <documentManagement>
-    <_ip_UnifiedCompliancePolicyUIAction xmlns="http://schemas.microsoft.com/sharepoint/v3" xsi:nil="true"/>
-    <Image xmlns="71af3243-3dd4-4a8d-8c0d-dd76da1f02a5">
-      <Url xsi:nil="true"/>
-      <Description xsi:nil="true"/>
-    </Image>
-    <Status xmlns="71af3243-3dd4-4a8d-8c0d-dd76da1f02a5">Not started</Status>
-    <Background xmlns="71af3243-3dd4-4a8d-8c0d-dd76da1f02a5">false</Background>
-    <_ip_UnifiedCompliancePolicyProperties xmlns="http://schemas.microsoft.com/sharepoint/v3" xsi:nil="true"/>
-    <ImageTagsTaxHTField xmlns="71af3243-3dd4-4a8d-8c0d-dd76da1f02a5">
-      <Terms xmlns="http://schemas.microsoft.com/office/infopath/2007/PartnerControls"/>
-    </ImageTagsTaxHTField>
-    <TaxCatchAll xmlns="230e9df3-be65-4c73-a93b-d1236ebd677e" xsi:nil="true"/>
-    <MediaServiceKeyPoints xmlns="71af3243-3dd4-4a8d-8c0d-dd76da1f02a5" xsi:nil="true"/>
-  </documentManagement>
-</p:properties>
-</file>
-
-<file path=customXml/item3.xml><?xml version="1.0" encoding="utf-8"?>
 <ct:contentTypeSchema xmlns:ct="http://schemas.microsoft.com/office/2006/metadata/contentType" xmlns:ma="http://schemas.microsoft.com/office/2006/metadata/properties/metaAttributes" ct:_="" ma:_="" ma:contentTypeName="Document" ma:contentTypeID="0x01010079F111ED35F8CC479449609E8A0923A6" ma:contentTypeVersion="28" ma:contentTypeDescription="Create a new document." ma:contentTypeScope="" ma:versionID="60f5a4f2d2b0abadcf532d48ebf9cb71">
   <xsd:schema xmlns:xsd="http://www.w3.org/2001/XMLSchema" xmlns:xs="http://www.w3.org/2001/XMLSchema" xmlns:p="http://schemas.microsoft.com/office/2006/metadata/properties" xmlns:ns1="http://schemas.microsoft.com/sharepoint/v3" xmlns:ns2="71af3243-3dd4-4a8d-8c0d-dd76da1f02a5" xmlns:ns3="16c05727-aa75-4e4a-9b5f-8a80a1165891" xmlns:ns4="230e9df3-be65-4c73-a93b-d1236ebd677e" targetNamespace="http://schemas.microsoft.com/office/2006/metadata/properties" ma:root="true" ma:fieldsID="7dd78129e6a1811f84807ad11c651531" ns1:_="" ns2:_="" ns3:_="" ns4:_="">
     <xsd:import namespace="http://schemas.microsoft.com/sharepoint/v3"/>
@@ -19631,27 +19618,36 @@
 </ct:contentTypeSchema>
 </file>
 
-<file path=customXml/itemProps1.xml><?xml version="1.0" encoding="utf-8"?>
-<ds:datastoreItem xmlns:ds="http://schemas.openxmlformats.org/officeDocument/2006/customXml" ds:itemID="{44137456-21FC-4AE2-8A94-BF06CAF2EB9B}">
-  <ds:schemaRefs>
-    <ds:schemaRef ds:uri="http://schemas.microsoft.com/sharepoint/v3/contenttype/forms"/>
-  </ds:schemaRefs>
-</ds:datastoreItem>
+<file path=customXml/item2.xml><?xml version="1.0" encoding="utf-8"?>
+<p:properties xmlns:p="http://schemas.microsoft.com/office/2006/metadata/properties" xmlns:xsi="http://www.w3.org/2001/XMLSchema-instance" xmlns:pc="http://schemas.microsoft.com/office/infopath/2007/PartnerControls">
+  <documentManagement>
+    <_ip_UnifiedCompliancePolicyUIAction xmlns="http://schemas.microsoft.com/sharepoint/v3" xsi:nil="true"/>
+    <Image xmlns="71af3243-3dd4-4a8d-8c0d-dd76da1f02a5">
+      <Url xsi:nil="true"/>
+      <Description xsi:nil="true"/>
+    </Image>
+    <Status xmlns="71af3243-3dd4-4a8d-8c0d-dd76da1f02a5">Not started</Status>
+    <Background xmlns="71af3243-3dd4-4a8d-8c0d-dd76da1f02a5">false</Background>
+    <_ip_UnifiedCompliancePolicyProperties xmlns="http://schemas.microsoft.com/sharepoint/v3" xsi:nil="true"/>
+    <ImageTagsTaxHTField xmlns="71af3243-3dd4-4a8d-8c0d-dd76da1f02a5">
+      <Terms xmlns="http://schemas.microsoft.com/office/infopath/2007/PartnerControls"/>
+    </ImageTagsTaxHTField>
+    <TaxCatchAll xmlns="230e9df3-be65-4c73-a93b-d1236ebd677e" xsi:nil="true"/>
+    <MediaServiceKeyPoints xmlns="71af3243-3dd4-4a8d-8c0d-dd76da1f02a5" xsi:nil="true"/>
+  </documentManagement>
+</p:properties>
 </file>
 
-<file path=customXml/itemProps2.xml><?xml version="1.0" encoding="utf-8"?>
-<ds:datastoreItem xmlns:ds="http://schemas.openxmlformats.org/officeDocument/2006/customXml" ds:itemID="{E305301E-11B3-4B9D-A588-21F3C9809371}">
-  <ds:schemaRefs>
-    <ds:schemaRef ds:uri="http://schemas.microsoft.com/office/2006/metadata/properties"/>
-    <ds:schemaRef ds:uri="http://schemas.microsoft.com/office/infopath/2007/PartnerControls"/>
-    <ds:schemaRef ds:uri="http://schemas.microsoft.com/sharepoint/v3"/>
-    <ds:schemaRef ds:uri="71af3243-3dd4-4a8d-8c0d-dd76da1f02a5"/>
-    <ds:schemaRef ds:uri="230e9df3-be65-4c73-a93b-d1236ebd677e"/>
-  </ds:schemaRefs>
-</ds:datastoreItem>
+<file path=customXml/item3.xml><?xml version="1.0" encoding="utf-8"?>
+<?mso-contentType ?>
+<FormTemplates xmlns="http://schemas.microsoft.com/sharepoint/v3/contenttype/forms">
+  <Display>DocumentLibraryForm</Display>
+  <Edit>DocumentLibraryForm</Edit>
+  <New>DocumentLibraryForm</New>
+</FormTemplates>
 </file>
 
-<file path=customXml/itemProps3.xml><?xml version="1.0" encoding="utf-8"?>
+<file path=customXml/itemProps1.xml><?xml version="1.0" encoding="utf-8"?>
 <ds:datastoreItem xmlns:ds="http://schemas.openxmlformats.org/officeDocument/2006/customXml" ds:itemID="{C77B561B-3A65-4A22-9691-EB838E7F9B87}">
   <ds:schemaRefs>
     <ds:schemaRef ds:uri="http://schemas.microsoft.com/office/2006/metadata/contentType"/>
@@ -19672,6 +19668,26 @@
 </ds:datastoreItem>
 </file>
 
+<file path=customXml/itemProps2.xml><?xml version="1.0" encoding="utf-8"?>
+<ds:datastoreItem xmlns:ds="http://schemas.openxmlformats.org/officeDocument/2006/customXml" ds:itemID="{E305301E-11B3-4B9D-A588-21F3C9809371}">
+  <ds:schemaRefs>
+    <ds:schemaRef ds:uri="http://schemas.microsoft.com/office/2006/metadata/properties"/>
+    <ds:schemaRef ds:uri="http://schemas.microsoft.com/office/infopath/2007/PartnerControls"/>
+    <ds:schemaRef ds:uri="http://schemas.microsoft.com/sharepoint/v3"/>
+    <ds:schemaRef ds:uri="71af3243-3dd4-4a8d-8c0d-dd76da1f02a5"/>
+    <ds:schemaRef ds:uri="230e9df3-be65-4c73-a93b-d1236ebd677e"/>
+  </ds:schemaRefs>
+</ds:datastoreItem>
+</file>
+
+<file path=customXml/itemProps3.xml><?xml version="1.0" encoding="utf-8"?>
+<ds:datastoreItem xmlns:ds="http://schemas.openxmlformats.org/officeDocument/2006/customXml" ds:itemID="{44137456-21FC-4AE2-8A94-BF06CAF2EB9B}">
+  <ds:schemaRefs>
+    <ds:schemaRef ds:uri="http://schemas.microsoft.com/sharepoint/v3/contenttype/forms"/>
+  </ds:schemaRefs>
+</ds:datastoreItem>
+</file>
+
 <file path=docMetadata/LabelInfo.xml><?xml version="1.0" encoding="utf-8"?>
 <clbl:labelList xmlns:clbl="http://schemas.microsoft.com/office/2020/mipLabelMetadata"/>
 </file>
</xml_diff>